<commit_message>
Qomex2019: fixed PDFs and metadata.
</commit_message>
<xml_diff>
--- a/2019-qomex-guse-et-al/poster.pptx
+++ b/2019-qomex-guse-et-al/poster.pptx
@@ -192,7 +192,7 @@
           <a:p>
             <a:fld id="{92692C55-6A58-4005-8794-0492A99A457D}" type="datetimeFigureOut">
               <a:rPr lang="de-DE" smtClean="0"/>
-              <a:t>06.06.2019</a:t>
+              <a:t>07.06.2019</a:t>
             </a:fld>
             <a:endParaRPr lang="de-DE"/>
           </a:p>
@@ -641,7 +641,7 @@
           <a:p>
             <a:fld id="{B67F8023-594E-484A-9628-78FADC408DDB}" type="datetimeFigureOut">
               <a:rPr lang="de-DE" smtClean="0"/>
-              <a:t>06.06.2019</a:t>
+              <a:t>07.06.2019</a:t>
             </a:fld>
             <a:endParaRPr lang="de-DE"/>
           </a:p>
@@ -811,7 +811,7 @@
           <a:p>
             <a:fld id="{B67F8023-594E-484A-9628-78FADC408DDB}" type="datetimeFigureOut">
               <a:rPr lang="de-DE" smtClean="0"/>
-              <a:t>06.06.2019</a:t>
+              <a:t>07.06.2019</a:t>
             </a:fld>
             <a:endParaRPr lang="de-DE"/>
           </a:p>
@@ -991,7 +991,7 @@
           <a:p>
             <a:fld id="{B67F8023-594E-484A-9628-78FADC408DDB}" type="datetimeFigureOut">
               <a:rPr lang="de-DE" smtClean="0"/>
-              <a:t>06.06.2019</a:t>
+              <a:t>07.06.2019</a:t>
             </a:fld>
             <a:endParaRPr lang="de-DE"/>
           </a:p>
@@ -1161,7 +1161,7 @@
           <a:p>
             <a:fld id="{B67F8023-594E-484A-9628-78FADC408DDB}" type="datetimeFigureOut">
               <a:rPr lang="de-DE" smtClean="0"/>
-              <a:t>06.06.2019</a:t>
+              <a:t>07.06.2019</a:t>
             </a:fld>
             <a:endParaRPr lang="de-DE"/>
           </a:p>
@@ -1407,7 +1407,7 @@
           <a:p>
             <a:fld id="{B67F8023-594E-484A-9628-78FADC408DDB}" type="datetimeFigureOut">
               <a:rPr lang="de-DE" smtClean="0"/>
-              <a:t>06.06.2019</a:t>
+              <a:t>07.06.2019</a:t>
             </a:fld>
             <a:endParaRPr lang="de-DE"/>
           </a:p>
@@ -1695,7 +1695,7 @@
           <a:p>
             <a:fld id="{B67F8023-594E-484A-9628-78FADC408DDB}" type="datetimeFigureOut">
               <a:rPr lang="de-DE" smtClean="0"/>
-              <a:t>06.06.2019</a:t>
+              <a:t>07.06.2019</a:t>
             </a:fld>
             <a:endParaRPr lang="de-DE"/>
           </a:p>
@@ -2122,7 +2122,7 @@
           <a:p>
             <a:fld id="{B67F8023-594E-484A-9628-78FADC408DDB}" type="datetimeFigureOut">
               <a:rPr lang="de-DE" smtClean="0"/>
-              <a:t>06.06.2019</a:t>
+              <a:t>07.06.2019</a:t>
             </a:fld>
             <a:endParaRPr lang="de-DE"/>
           </a:p>
@@ -2240,7 +2240,7 @@
           <a:p>
             <a:fld id="{B67F8023-594E-484A-9628-78FADC408DDB}" type="datetimeFigureOut">
               <a:rPr lang="de-DE" smtClean="0"/>
-              <a:t>06.06.2019</a:t>
+              <a:t>07.06.2019</a:t>
             </a:fld>
             <a:endParaRPr lang="de-DE"/>
           </a:p>
@@ -2335,7 +2335,7 @@
           <a:p>
             <a:fld id="{B67F8023-594E-484A-9628-78FADC408DDB}" type="datetimeFigureOut">
               <a:rPr lang="de-DE" smtClean="0"/>
-              <a:t>06.06.2019</a:t>
+              <a:t>07.06.2019</a:t>
             </a:fld>
             <a:endParaRPr lang="de-DE"/>
           </a:p>
@@ -2612,7 +2612,7 @@
           <a:p>
             <a:fld id="{B67F8023-594E-484A-9628-78FADC408DDB}" type="datetimeFigureOut">
               <a:rPr lang="de-DE" smtClean="0"/>
-              <a:t>06.06.2019</a:t>
+              <a:t>07.06.2019</a:t>
             </a:fld>
             <a:endParaRPr lang="de-DE"/>
           </a:p>
@@ -2865,7 +2865,7 @@
           <a:p>
             <a:fld id="{B67F8023-594E-484A-9628-78FADC408DDB}" type="datetimeFigureOut">
               <a:rPr lang="de-DE" smtClean="0"/>
-              <a:t>06.06.2019</a:t>
+              <a:t>07.06.2019</a:t>
             </a:fld>
             <a:endParaRPr lang="de-DE"/>
           </a:p>
@@ -3078,7 +3078,7 @@
           <a:p>
             <a:fld id="{B67F8023-594E-484A-9628-78FADC408DDB}" type="datetimeFigureOut">
               <a:rPr lang="de-DE" smtClean="0"/>
-              <a:t>06.06.2019</a:t>
+              <a:t>07.06.2019</a:t>
             </a:fld>
             <a:endParaRPr lang="de-DE"/>
           </a:p>
@@ -7095,14 +7095,7 @@
                 <a:latin typeface="Arial" panose="020B0604020202020204" pitchFamily="34" charset="0"/>
                 <a:cs typeface="Arial" panose="020B0604020202020204" pitchFamily="34" charset="0"/>
               </a:rPr>
-              <a:t>” </a:t>
-            </a:r>
-            <a:r>
-              <a:rPr lang="en-US" sz="1800" dirty="0" smtClean="0">
-                <a:latin typeface="Arial" panose="020B0604020202020204" pitchFamily="34" charset="0"/>
-                <a:cs typeface="Arial" panose="020B0604020202020204" pitchFamily="34" charset="0"/>
-              </a:rPr>
-              <a:t>by I </a:t>
+              <a:t>” by I </a:t>
             </a:r>
             <a:r>
               <a:rPr lang="en-US" sz="1800" dirty="0" err="1">

</xml_diff>